<commit_message>
LLD e HLD prontos, slides prontos, planejamento pronto, documentação parcialmente pronta
</commit_message>
<xml_diff>
--- a/Apresentação projeto individual.pptx
+++ b/Apresentação projeto individual.pptx
@@ -107,6 +107,11 @@
       </a:defRPr>
     </a:lvl9pPr>
   </p:defaultTextStyle>
+  <p:extLst>
+    <p:ext uri="{EFAFB233-063F-42B5-8137-9DF3F51BA10A}">
+      <p15:sldGuideLst xmlns:p15="http://schemas.microsoft.com/office/powerpoint/2012/main"/>
+    </p:ext>
+  </p:extLst>
 </p:presentation>
 </file>
 
@@ -257,7 +262,7 @@
           <a:p>
             <a:fld id="{73344C5C-3445-4015-8CFF-2743EF42D90F}" type="datetimeFigureOut">
               <a:rPr lang="pt-BR" smtClean="0"/>
-              <a:t>29/05/2021</a:t>
+              <a:t>30/05/2021</a:t>
             </a:fld>
             <a:endParaRPr lang="pt-BR"/>
           </a:p>
@@ -455,7 +460,7 @@
           <a:p>
             <a:fld id="{73344C5C-3445-4015-8CFF-2743EF42D90F}" type="datetimeFigureOut">
               <a:rPr lang="pt-BR" smtClean="0"/>
-              <a:t>29/05/2021</a:t>
+              <a:t>30/05/2021</a:t>
             </a:fld>
             <a:endParaRPr lang="pt-BR"/>
           </a:p>
@@ -663,7 +668,7 @@
           <a:p>
             <a:fld id="{73344C5C-3445-4015-8CFF-2743EF42D90F}" type="datetimeFigureOut">
               <a:rPr lang="pt-BR" smtClean="0"/>
-              <a:t>29/05/2021</a:t>
+              <a:t>30/05/2021</a:t>
             </a:fld>
             <a:endParaRPr lang="pt-BR"/>
           </a:p>
@@ -861,7 +866,7 @@
           <a:p>
             <a:fld id="{73344C5C-3445-4015-8CFF-2743EF42D90F}" type="datetimeFigureOut">
               <a:rPr lang="pt-BR" smtClean="0"/>
-              <a:t>29/05/2021</a:t>
+              <a:t>30/05/2021</a:t>
             </a:fld>
             <a:endParaRPr lang="pt-BR"/>
           </a:p>
@@ -1136,7 +1141,7 @@
           <a:p>
             <a:fld id="{73344C5C-3445-4015-8CFF-2743EF42D90F}" type="datetimeFigureOut">
               <a:rPr lang="pt-BR" smtClean="0"/>
-              <a:t>29/05/2021</a:t>
+              <a:t>30/05/2021</a:t>
             </a:fld>
             <a:endParaRPr lang="pt-BR"/>
           </a:p>
@@ -1401,7 +1406,7 @@
           <a:p>
             <a:fld id="{73344C5C-3445-4015-8CFF-2743EF42D90F}" type="datetimeFigureOut">
               <a:rPr lang="pt-BR" smtClean="0"/>
-              <a:t>29/05/2021</a:t>
+              <a:t>30/05/2021</a:t>
             </a:fld>
             <a:endParaRPr lang="pt-BR"/>
           </a:p>
@@ -1813,7 +1818,7 @@
           <a:p>
             <a:fld id="{73344C5C-3445-4015-8CFF-2743EF42D90F}" type="datetimeFigureOut">
               <a:rPr lang="pt-BR" smtClean="0"/>
-              <a:t>29/05/2021</a:t>
+              <a:t>30/05/2021</a:t>
             </a:fld>
             <a:endParaRPr lang="pt-BR"/>
           </a:p>
@@ -1954,7 +1959,7 @@
           <a:p>
             <a:fld id="{73344C5C-3445-4015-8CFF-2743EF42D90F}" type="datetimeFigureOut">
               <a:rPr lang="pt-BR" smtClean="0"/>
-              <a:t>29/05/2021</a:t>
+              <a:t>30/05/2021</a:t>
             </a:fld>
             <a:endParaRPr lang="pt-BR"/>
           </a:p>
@@ -2067,7 +2072,7 @@
           <a:p>
             <a:fld id="{73344C5C-3445-4015-8CFF-2743EF42D90F}" type="datetimeFigureOut">
               <a:rPr lang="pt-BR" smtClean="0"/>
-              <a:t>29/05/2021</a:t>
+              <a:t>30/05/2021</a:t>
             </a:fld>
             <a:endParaRPr lang="pt-BR"/>
           </a:p>
@@ -2378,7 +2383,7 @@
           <a:p>
             <a:fld id="{73344C5C-3445-4015-8CFF-2743EF42D90F}" type="datetimeFigureOut">
               <a:rPr lang="pt-BR" smtClean="0"/>
-              <a:t>29/05/2021</a:t>
+              <a:t>30/05/2021</a:t>
             </a:fld>
             <a:endParaRPr lang="pt-BR"/>
           </a:p>
@@ -2666,7 +2671,7 @@
           <a:p>
             <a:fld id="{73344C5C-3445-4015-8CFF-2743EF42D90F}" type="datetimeFigureOut">
               <a:rPr lang="pt-BR" smtClean="0"/>
-              <a:t>29/05/2021</a:t>
+              <a:t>30/05/2021</a:t>
             </a:fld>
             <a:endParaRPr lang="pt-BR"/>
           </a:p>
@@ -2907,7 +2912,7 @@
           <a:p>
             <a:fld id="{73344C5C-3445-4015-8CFF-2743EF42D90F}" type="datetimeFigureOut">
               <a:rPr lang="pt-BR" smtClean="0"/>
-              <a:t>29/05/2021</a:t>
+              <a:t>30/05/2021</a:t>
             </a:fld>
             <a:endParaRPr lang="pt-BR"/>
           </a:p>
@@ -4887,13 +4892,18 @@
           <a:p>
             <a:pPr algn="ctr"/>
             <a:r>
-              <a:rPr lang="pt-BR" sz="5400" dirty="0">
+              <a:rPr lang="pt-BR" sz="5400">
                 <a:solidFill>
                   <a:srgbClr val="534F46"/>
                 </a:solidFill>
               </a:rPr>
               <a:t>Muito obrigado pela atenção</a:t>
             </a:r>
+            <a:endParaRPr lang="pt-BR" sz="5400" dirty="0">
+              <a:solidFill>
+                <a:srgbClr val="534F46"/>
+              </a:solidFill>
+            </a:endParaRPr>
           </a:p>
         </p:txBody>
       </p:sp>

</xml_diff>

<commit_message>
Site salvando dados do slot no banco e prograssão da documentação
</commit_message>
<xml_diff>
--- a/Apresentação projeto individual.pptx
+++ b/Apresentação projeto individual.pptx
@@ -8,7 +8,8 @@
     <p:sldId id="256" r:id="rId2"/>
     <p:sldId id="257" r:id="rId3"/>
     <p:sldId id="258" r:id="rId4"/>
-    <p:sldId id="260" r:id="rId5"/>
+    <p:sldId id="261" r:id="rId5"/>
+    <p:sldId id="260" r:id="rId6"/>
   </p:sldIdLst>
   <p:sldSz cx="12192000" cy="6858000"/>
   <p:notesSz cx="6858000" cy="9144000"/>
@@ -4864,6 +4865,125 @@
       </p:grpSpPr>
       <p:sp>
         <p:nvSpPr>
+          <p:cNvPr id="49" name="CaixaDeTexto 48">
+            <a:extLst>
+              <a:ext uri="{FF2B5EF4-FFF2-40B4-BE49-F238E27FC236}">
+                <a16:creationId xmlns:a16="http://schemas.microsoft.com/office/drawing/2014/main" id="{14E0CCC1-C94E-421D-86B4-B5EA311A74DE}"/>
+              </a:ext>
+            </a:extLst>
+          </p:cNvPr>
+          <p:cNvSpPr txBox="1"/>
+          <p:nvPr/>
+        </p:nvSpPr>
+        <p:spPr>
+          <a:xfrm>
+            <a:off x="324683" y="478172"/>
+            <a:ext cx="3265805" cy="707886"/>
+          </a:xfrm>
+          <a:prstGeom prst="rect">
+            <a:avLst/>
+          </a:prstGeom>
+          <a:noFill/>
+        </p:spPr>
+        <p:txBody>
+          <a:bodyPr wrap="square" rtlCol="0">
+            <a:spAutoFit/>
+          </a:bodyPr>
+          <a:lstStyle/>
+          <a:p>
+            <a:r>
+              <a:rPr lang="pt-BR" sz="4000" dirty="0">
+                <a:solidFill>
+                  <a:srgbClr val="534F46"/>
+                </a:solidFill>
+              </a:rPr>
+              <a:t>Modelo Lógico</a:t>
+            </a:r>
+          </a:p>
+        </p:txBody>
+      </p:sp>
+      <p:pic>
+        <p:nvPicPr>
+          <p:cNvPr id="3" name="Imagem 2" descr="Uma imagem contendo Diagrama&#10;&#10;Descrição gerada automaticamente">
+            <a:extLst>
+              <a:ext uri="{FF2B5EF4-FFF2-40B4-BE49-F238E27FC236}">
+                <a16:creationId xmlns:a16="http://schemas.microsoft.com/office/drawing/2014/main" id="{15CFF40F-02B1-4883-AF4E-EC83224C9203}"/>
+              </a:ext>
+            </a:extLst>
+          </p:cNvPr>
+          <p:cNvPicPr>
+            <a:picLocks noChangeAspect="1"/>
+          </p:cNvPicPr>
+          <p:nvPr/>
+        </p:nvPicPr>
+        <p:blipFill>
+          <a:blip r:embed="rId3">
+            <a:extLst>
+              <a:ext uri="{28A0092B-C50C-407E-A947-70E740481C1C}">
+                <a14:useLocalDpi xmlns:a14="http://schemas.microsoft.com/office/drawing/2010/main" val="0"/>
+              </a:ext>
+            </a:extLst>
+          </a:blip>
+          <a:stretch>
+            <a:fillRect/>
+          </a:stretch>
+        </p:blipFill>
+        <p:spPr>
+          <a:xfrm>
+            <a:off x="2252126" y="1337970"/>
+            <a:ext cx="7687748" cy="4182059"/>
+          </a:xfrm>
+          <a:prstGeom prst="rect">
+            <a:avLst/>
+          </a:prstGeom>
+        </p:spPr>
+      </p:pic>
+    </p:spTree>
+    <p:extLst>
+      <p:ext uri="{BB962C8B-B14F-4D97-AF65-F5344CB8AC3E}">
+        <p14:creationId xmlns:p14="http://schemas.microsoft.com/office/powerpoint/2010/main" val="1707755266"/>
+      </p:ext>
+    </p:extLst>
+  </p:cSld>
+  <p:clrMapOvr>
+    <a:masterClrMapping/>
+  </p:clrMapOvr>
+</p:sld>
+</file>
+
+<file path=ppt/slides/slide5.xml><?xml version="1.0" encoding="utf-8"?>
+<p:sld xmlns:a="http://schemas.openxmlformats.org/drawingml/2006/main" xmlns:r="http://schemas.openxmlformats.org/officeDocument/2006/relationships" xmlns:p="http://schemas.openxmlformats.org/presentationml/2006/main">
+  <p:cSld>
+    <p:bg>
+      <p:bgPr>
+        <a:blipFill dpi="0" rotWithShape="1">
+          <a:blip r:embed="rId2">
+            <a:lum/>
+          </a:blip>
+          <a:srcRect/>
+          <a:stretch>
+            <a:fillRect/>
+          </a:stretch>
+        </a:blipFill>
+        <a:effectLst/>
+      </p:bgPr>
+    </p:bg>
+    <p:spTree>
+      <p:nvGrpSpPr>
+        <p:cNvPr id="1" name=""/>
+        <p:cNvGrpSpPr/>
+        <p:nvPr/>
+      </p:nvGrpSpPr>
+      <p:grpSpPr>
+        <a:xfrm>
+          <a:off x="0" y="0"/>
+          <a:ext cx="0" cy="0"/>
+          <a:chOff x="0" y="0"/>
+          <a:chExt cx="0" cy="0"/>
+        </a:xfrm>
+      </p:grpSpPr>
+      <p:sp>
+        <p:nvSpPr>
           <p:cNvPr id="2" name="Título 1">
             <a:extLst>
               <a:ext uri="{FF2B5EF4-FFF2-40B4-BE49-F238E27FC236}">

</xml_diff>